<commit_message>
Se agrego a la presentacion de PP.
</commit_message>
<xml_diff>
--- a/Presentacion.pptx
+++ b/Presentacion.pptx
@@ -5,7 +5,7 @@
     <p:sldMasterId id="2147483659" r:id="rId1"/>
   </p:sldMasterIdLst>
   <p:notesMasterIdLst>
-    <p:notesMasterId r:id="rId11"/>
+    <p:notesMasterId r:id="rId12"/>
   </p:notesMasterIdLst>
   <p:sldIdLst>
     <p:sldId id="256" r:id="rId2"/>
@@ -17,6 +17,7 @@
     <p:sldId id="261" r:id="rId8"/>
     <p:sldId id="262" r:id="rId9"/>
     <p:sldId id="264" r:id="rId10"/>
+    <p:sldId id="265" r:id="rId11"/>
   </p:sldIdLst>
   <p:sldSz cx="9144000" cy="5143500" type="screen16x9"/>
   <p:notesSz cx="6858000" cy="9144000"/>
@@ -6173,6 +6174,82 @@
 </p:sld>
 </file>
 
+<file path=ppt/slides/slide10.xml><?xml version="1.0" encoding="utf-8"?>
+<p:sld xmlns:a="http://schemas.openxmlformats.org/drawingml/2006/main" xmlns:r="http://schemas.openxmlformats.org/officeDocument/2006/relationships" xmlns:p="http://schemas.openxmlformats.org/presentationml/2006/main">
+  <p:cSld>
+    <p:spTree>
+      <p:nvGrpSpPr>
+        <p:cNvPr id="1" name=""/>
+        <p:cNvGrpSpPr/>
+        <p:nvPr/>
+      </p:nvGrpSpPr>
+      <p:grpSpPr>
+        <a:xfrm>
+          <a:off x="0" y="0"/>
+          <a:ext cx="0" cy="0"/>
+          <a:chOff x="0" y="0"/>
+          <a:chExt cx="0" cy="0"/>
+        </a:xfrm>
+      </p:grpSpPr>
+      <p:sp>
+        <p:nvSpPr>
+          <p:cNvPr id="2" name="Título 1"/>
+          <p:cNvSpPr>
+            <a:spLocks noGrp="1"/>
+          </p:cNvSpPr>
+          <p:nvPr>
+            <p:ph type="title"/>
+          </p:nvPr>
+        </p:nvSpPr>
+        <p:spPr/>
+        <p:txBody>
+          <a:bodyPr/>
+          <a:lstStyle/>
+          <a:p>
+            <a:r>
+              <a:rPr lang="es-ES" dirty="0" smtClean="0"/>
+              <a:t>Conclusiones</a:t>
+            </a:r>
+            <a:endParaRPr lang="es-CO" dirty="0"/>
+          </a:p>
+        </p:txBody>
+      </p:sp>
+      <p:sp>
+        <p:nvSpPr>
+          <p:cNvPr id="3" name="Marcador de texto 2"/>
+          <p:cNvSpPr>
+            <a:spLocks noGrp="1"/>
+          </p:cNvSpPr>
+          <p:nvPr>
+            <p:ph type="body" idx="1"/>
+          </p:nvPr>
+        </p:nvSpPr>
+        <p:spPr/>
+        <p:txBody>
+          <a:bodyPr/>
+          <a:lstStyle/>
+          <a:p>
+            <a:r>
+              <a:rPr lang="es-ES" dirty="0" smtClean="0"/>
+              <a:t>Después de realizar el programa y probarlo nosotros mismos, podemos apreciar que este software disminuirá los tiempos de registro de artículos abandonados debido a la sencillez y utilidad de este mismo.</a:t>
+            </a:r>
+            <a:endParaRPr lang="es-CO" dirty="0"/>
+          </a:p>
+        </p:txBody>
+      </p:sp>
+    </p:spTree>
+    <p:extLst>
+      <p:ext uri="{BB962C8B-B14F-4D97-AF65-F5344CB8AC3E}">
+        <p14:creationId xmlns:p14="http://schemas.microsoft.com/office/powerpoint/2010/main" val="2540377094"/>
+      </p:ext>
+    </p:extLst>
+  </p:cSld>
+  <p:clrMapOvr>
+    <a:masterClrMapping/>
+  </p:clrMapOvr>
+</p:sld>
+</file>
+
 <file path=ppt/slides/slide2.xml><?xml version="1.0" encoding="utf-8"?>
 <p:sld xmlns:a="http://schemas.openxmlformats.org/drawingml/2006/main" xmlns:r="http://schemas.openxmlformats.org/officeDocument/2006/relationships" xmlns:p="http://schemas.openxmlformats.org/presentationml/2006/main">
   <p:cSld>
@@ -6555,42 +6632,12 @@
       </p:sp>
       <p:pic>
         <p:nvPicPr>
-          <p:cNvPr id="68" name="Google Shape;68;p15" descr="Estudiantes de la Icesi denuncian que desde hace seis meses se vienen reportando hurtos de celulares, computadores portátiles y tablets dentro del campus." title="Preocupación por constantes robos en reconocida Universidad del sur de Cali">
-            <a:hlinkClick r:id="rId3"/>
-          </p:cNvPr>
-          <p:cNvPicPr preferRelativeResize="0"/>
-          <p:nvPr/>
-        </p:nvPicPr>
-        <p:blipFill>
-          <a:blip r:embed="rId4">
-            <a:alphaModFix/>
-          </a:blip>
-          <a:stretch>
-            <a:fillRect/>
-          </a:stretch>
-        </p:blipFill>
-        <p:spPr>
-          <a:xfrm>
-            <a:off x="471100" y="1168200"/>
-            <a:ext cx="4050725" cy="3429000"/>
-          </a:xfrm>
-          <a:prstGeom prst="rect">
-            <a:avLst/>
-          </a:prstGeom>
-          <a:noFill/>
-          <a:ln>
-            <a:noFill/>
-          </a:ln>
-        </p:spPr>
-      </p:pic>
-      <p:pic>
-        <p:nvPicPr>
           <p:cNvPr id="69" name="Google Shape;69;p15"/>
           <p:cNvPicPr preferRelativeResize="0"/>
           <p:nvPr/>
         </p:nvPicPr>
         <p:blipFill rotWithShape="1">
-          <a:blip r:embed="rId5">
+          <a:blip r:embed="rId3">
             <a:alphaModFix/>
           </a:blip>
           <a:srcRect t="7796" r="14288" b="14315"/>
@@ -6617,7 +6664,7 @@
           <p:nvPr/>
         </p:nvPicPr>
         <p:blipFill rotWithShape="1">
-          <a:blip r:embed="rId6">
+          <a:blip r:embed="rId4">
             <a:alphaModFix/>
           </a:blip>
           <a:srcRect t="18256" r="7859" b="21691"/>
@@ -6644,7 +6691,7 @@
           <p:nvPr/>
         </p:nvPicPr>
         <p:blipFill rotWithShape="1">
-          <a:blip r:embed="rId7">
+          <a:blip r:embed="rId5">
             <a:alphaModFix/>
           </a:blip>
           <a:srcRect l="1700" t="12419" b="31910"/>
@@ -6664,6 +6711,106 @@
           </a:ln>
         </p:spPr>
       </p:pic>
+      <p:sp>
+        <p:nvSpPr>
+          <p:cNvPr id="2" name="CuadroTexto 1"/>
+          <p:cNvSpPr txBox="1"/>
+          <p:nvPr/>
+        </p:nvSpPr>
+        <p:spPr>
+          <a:xfrm>
+            <a:off x="329556" y="1355424"/>
+            <a:ext cx="4149575" cy="1815882"/>
+          </a:xfrm>
+          <a:prstGeom prst="rect">
+            <a:avLst/>
+          </a:prstGeom>
+          <a:noFill/>
+        </p:spPr>
+        <p:txBody>
+          <a:bodyPr wrap="square" rtlCol="0">
+            <a:spAutoFit/>
+          </a:bodyPr>
+          <a:lstStyle/>
+          <a:p>
+            <a:pPr marL="285750" indent="-285750">
+              <a:buFont typeface="Arial" panose="020B0604020202020204" pitchFamily="34" charset="0"/>
+              <a:buChar char="•"/>
+            </a:pPr>
+            <a:r>
+              <a:rPr lang="es-ES" dirty="0" smtClean="0"/>
+              <a:t>Se investigo el funcionamiento de</a:t>
+            </a:r>
+            <a:r>
+              <a:rPr lang="es-CO" dirty="0" smtClean="0"/>
+              <a:t> la herramienta </a:t>
+            </a:r>
+            <a:r>
+              <a:rPr lang="es-ES" dirty="0" smtClean="0"/>
+              <a:t>Visual Studio.</a:t>
+            </a:r>
+          </a:p>
+          <a:p>
+            <a:pPr marL="285750" indent="-285750">
+              <a:buFont typeface="Arial" panose="020B0604020202020204" pitchFamily="34" charset="0"/>
+              <a:buChar char="•"/>
+            </a:pPr>
+            <a:r>
+              <a:rPr lang="es-ES" dirty="0" smtClean="0"/>
+              <a:t>Se investigo la sintaxis del lenguaje Linq</a:t>
+            </a:r>
+          </a:p>
+          <a:p>
+            <a:pPr marL="285750" indent="-285750">
+              <a:buFont typeface="Arial" panose="020B0604020202020204" pitchFamily="34" charset="0"/>
+              <a:buChar char="•"/>
+            </a:pPr>
+            <a:r>
+              <a:rPr lang="es-ES" dirty="0" smtClean="0"/>
+              <a:t>Se investigaron nuevos comandos para usar</a:t>
+            </a:r>
+            <a:br>
+              <a:rPr lang="es-ES" dirty="0" smtClean="0"/>
+            </a:br>
+            <a:r>
+              <a:rPr lang="es-ES" dirty="0" smtClean="0"/>
+              <a:t>en el Git Bash.</a:t>
+            </a:r>
+          </a:p>
+          <a:p>
+            <a:pPr marL="285750" indent="-285750">
+              <a:buFont typeface="Arial" panose="020B0604020202020204" pitchFamily="34" charset="0"/>
+              <a:buChar char="•"/>
+            </a:pPr>
+            <a:r>
+              <a:rPr lang="es-ES" dirty="0" smtClean="0"/>
+              <a:t>Se entrevisto a un guarda para averiguar</a:t>
+            </a:r>
+            <a:r>
+              <a:rPr lang="es-ES" dirty="0"/>
+              <a:t/>
+            </a:r>
+            <a:br>
+              <a:rPr lang="es-ES" dirty="0"/>
+            </a:br>
+            <a:r>
+              <a:rPr lang="es-ES" dirty="0" smtClean="0"/>
+              <a:t>sobre el proceso de registro de artículos</a:t>
+            </a:r>
+            <a:r>
+              <a:rPr lang="es-ES" dirty="0"/>
+              <a:t/>
+            </a:r>
+            <a:br>
+              <a:rPr lang="es-ES" dirty="0"/>
+            </a:br>
+            <a:r>
+              <a:rPr lang="es-ES" dirty="0" smtClean="0"/>
+              <a:t>abandonados.</a:t>
+            </a:r>
+          </a:p>
+        </p:txBody>
+      </p:sp>
     </p:spTree>
   </p:cSld>
   <p:clrMapOvr>

</xml_diff>